<commit_message>
Added ppt as pdf
</commit_message>
<xml_diff>
--- a/ApartmentRater.pptx
+++ b/ApartmentRater.pptx
@@ -113,6 +113,11 @@
       </a:defRPr>
     </a:lvl9pPr>
   </p:defaultTextStyle>
+  <p:extLst>
+    <p:ext uri="{EFAFB233-063F-42B5-8137-9DF3F51BA10A}">
+      <p15:sldGuideLst xmlns:p15="http://schemas.microsoft.com/office/powerpoint/2012/main"/>
+    </p:ext>
+  </p:extLst>
 </p:presentation>
 </file>
 
@@ -161,7 +166,6 @@
               <a:rPr lang="en-US"/>
               <a:t>Click to edit Master title style</a:t>
             </a:r>
-            <a:endParaRPr lang="en-US"/>
           </a:p>
         </p:txBody>
       </p:sp>
@@ -226,7 +230,6 @@
               <a:rPr lang="en-US"/>
               <a:t>Click to edit Master subtitle style</a:t>
             </a:r>
-            <a:endParaRPr lang="en-US"/>
           </a:p>
         </p:txBody>
       </p:sp>
@@ -344,7 +347,6 @@
               <a:rPr lang="en-US"/>
               <a:t>Click to edit Master title style</a:t>
             </a:r>
-            <a:endParaRPr lang="en-US"/>
           </a:p>
         </p:txBody>
       </p:sp>
@@ -396,7 +398,6 @@
               <a:rPr lang="en-US"/>
               <a:t>Fifth level</a:t>
             </a:r>
-            <a:endParaRPr lang="en-US"/>
           </a:p>
         </p:txBody>
       </p:sp>
@@ -519,7 +520,6 @@
               <a:rPr lang="en-US"/>
               <a:t>Click to edit Master title style</a:t>
             </a:r>
-            <a:endParaRPr lang="en-US"/>
           </a:p>
         </p:txBody>
       </p:sp>
@@ -576,7 +576,6 @@
               <a:rPr lang="en-US"/>
               <a:t>Fifth level</a:t>
             </a:r>
-            <a:endParaRPr lang="en-US"/>
           </a:p>
         </p:txBody>
       </p:sp>
@@ -694,7 +693,6 @@
               <a:rPr lang="en-US"/>
               <a:t>Click to edit Master title style</a:t>
             </a:r>
-            <a:endParaRPr lang="en-US"/>
           </a:p>
         </p:txBody>
       </p:sp>
@@ -746,7 +744,6 @@
               <a:rPr lang="en-US"/>
               <a:t>Fifth level</a:t>
             </a:r>
-            <a:endParaRPr lang="en-US"/>
           </a:p>
         </p:txBody>
       </p:sp>
@@ -873,7 +870,6 @@
               <a:rPr lang="en-US"/>
               <a:t>Click to edit Master title style</a:t>
             </a:r>
-            <a:endParaRPr lang="en-US"/>
           </a:p>
         </p:txBody>
       </p:sp>
@@ -1110,7 +1106,6 @@
               <a:rPr lang="en-US"/>
               <a:t>Click to edit Master title style</a:t>
             </a:r>
-            <a:endParaRPr lang="en-US"/>
           </a:p>
         </p:txBody>
       </p:sp>
@@ -1167,7 +1162,6 @@
               <a:rPr lang="en-US"/>
               <a:t>Fifth level</a:t>
             </a:r>
-            <a:endParaRPr lang="en-US"/>
           </a:p>
         </p:txBody>
       </p:sp>
@@ -1224,7 +1218,6 @@
               <a:rPr lang="en-US"/>
               <a:t>Fifth level</a:t>
             </a:r>
-            <a:endParaRPr lang="en-US"/>
           </a:p>
         </p:txBody>
       </p:sp>
@@ -1347,7 +1340,6 @@
               <a:rPr lang="en-US"/>
               <a:t>Click to edit Master title style</a:t>
             </a:r>
-            <a:endParaRPr lang="en-US"/>
           </a:p>
         </p:txBody>
       </p:sp>
@@ -1469,7 +1461,6 @@
               <a:rPr lang="en-US"/>
               <a:t>Fifth level</a:t>
             </a:r>
-            <a:endParaRPr lang="en-US"/>
           </a:p>
         </p:txBody>
       </p:sp>
@@ -1591,7 +1582,6 @@
               <a:rPr lang="en-US"/>
               <a:t>Fifth level</a:t>
             </a:r>
-            <a:endParaRPr lang="en-US"/>
           </a:p>
         </p:txBody>
       </p:sp>
@@ -1709,7 +1699,6 @@
               <a:rPr lang="en-US"/>
               <a:t>Click to edit Master title style</a:t>
             </a:r>
-            <a:endParaRPr lang="en-US"/>
           </a:p>
         </p:txBody>
       </p:sp>
@@ -1931,7 +1920,6 @@
               <a:rPr lang="en-US"/>
               <a:t>Click to edit Master title style</a:t>
             </a:r>
-            <a:endParaRPr lang="en-US"/>
           </a:p>
         </p:txBody>
       </p:sp>
@@ -2016,7 +2004,6 @@
               <a:rPr lang="en-US"/>
               <a:t>Fifth level</a:t>
             </a:r>
-            <a:endParaRPr lang="en-US"/>
           </a:p>
         </p:txBody>
       </p:sp>
@@ -2208,7 +2195,6 @@
               <a:rPr lang="en-US"/>
               <a:t>Click to edit Master title style</a:t>
             </a:r>
-            <a:endParaRPr lang="en-US"/>
           </a:p>
         </p:txBody>
       </p:sp>
@@ -2467,7 +2453,6 @@
               <a:rPr lang="en-US"/>
               <a:t>Click to edit Master title style</a:t>
             </a:r>
-            <a:endParaRPr lang="en-US"/>
           </a:p>
         </p:txBody>
       </p:sp>
@@ -2529,7 +2514,6 @@
               <a:rPr lang="en-US"/>
               <a:t>Fifth level</a:t>
             </a:r>
-            <a:endParaRPr lang="en-US"/>
           </a:p>
         </p:txBody>
       </p:sp>
@@ -3007,7 +2991,9 @@
         </p:nvSpPr>
         <p:spPr/>
         <p:txBody>
-          <a:bodyPr/>
+          <a:bodyPr>
+            <a:normAutofit lnSpcReduction="10000"/>
+          </a:bodyPr>
           <a:lstStyle/>
           <a:p>
             <a:r>
@@ -3060,6 +3046,36 @@
               <a:rPr lang="en-US" dirty="0"/>
               <a:t>)</a:t>
             </a:r>
+          </a:p>
+          <a:p>
+            <a:r>
+              <a:rPr lang="en-US" dirty="0"/>
+              <a:t>Our </a:t>
+            </a:r>
+            <a:r>
+              <a:rPr lang="en-US" dirty="0" err="1"/>
+              <a:t>Github</a:t>
+            </a:r>
+            <a:r>
+              <a:rPr lang="en-US" dirty="0"/>
+              <a:t> Link-</a:t>
+            </a:r>
+          </a:p>
+          <a:p>
+            <a:r>
+              <a:rPr lang="en-US" dirty="0"/>
+              <a:t>https://</a:t>
+            </a:r>
+            <a:r>
+              <a:rPr lang="en-US" dirty="0">
+                <a:hlinkClick r:id="rId4"/>
+              </a:rPr>
+              <a:t>github.com/01akanksha/AppartmentRater</a:t>
+            </a:r>
+            <a:endParaRPr lang="en-US" dirty="0"/>
+          </a:p>
+          <a:p>
+            <a:endParaRPr lang="en-US" dirty="0"/>
           </a:p>
         </p:txBody>
       </p:sp>
@@ -3158,6 +3174,9 @@
               </a:rPr>
               <a:t>github.com/01akanksha/AppartmentRater</a:t>
             </a:r>
+            <a:endParaRPr lang="en-US" dirty="0"/>
+          </a:p>
+          <a:p>
             <a:endParaRPr lang="en-US" dirty="0"/>
           </a:p>
         </p:txBody>
@@ -3860,7 +3879,7 @@
         </p:blipFill>
         <p:spPr>
           <a:xfrm>
-            <a:off x="6425406" y="2699544"/>
+            <a:off x="6425406" y="2726048"/>
             <a:ext cx="4676775" cy="3295650"/>
           </a:xfrm>
           <a:prstGeom prst="rect">
@@ -4000,7 +4019,7 @@
           <a:p>
             <a:r>
               <a:rPr lang="en-US" dirty="0"/>
-              <a:t>Issues we faced-	</a:t>
+              <a:t>Issues we faced and Learnings-	</a:t>
             </a:r>
           </a:p>
         </p:txBody>
@@ -4045,6 +4064,31 @@
             <a:r>
               <a:rPr lang="en-US" dirty="0"/>
               <a:t> access drivers(open source) to connect.</a:t>
+            </a:r>
+          </a:p>
+          <a:p>
+            <a:r>
+              <a:rPr lang="en-US" dirty="0"/>
+              <a:t>The Email sending </a:t>
+            </a:r>
+            <a:r>
+              <a:rPr lang="en-US"/>
+              <a:t>on booking.</a:t>
+            </a:r>
+            <a:endParaRPr lang="en-US" dirty="0"/>
+          </a:p>
+          <a:p>
+            <a:r>
+              <a:rPr lang="en-US" dirty="0"/>
+              <a:t>We have learned how Rest API </a:t>
+            </a:r>
+            <a:r>
+              <a:rPr lang="en-US" dirty="0" err="1"/>
+              <a:t>works,github,OpenSource</a:t>
+            </a:r>
+            <a:r>
+              <a:rPr lang="en-US" dirty="0"/>
+              <a:t>.</a:t>
             </a:r>
           </a:p>
         </p:txBody>
@@ -4130,6 +4174,18 @@
           <a:p>
             <a:r>
               <a:rPr lang="en-US" dirty="0"/>
+              <a:t>Need to improve the Rating logic</a:t>
+            </a:r>
+          </a:p>
+          <a:p>
+            <a:r>
+              <a:rPr lang="en-US" dirty="0"/>
+              <a:t>Enhance the database with more areas and switch from Access to any other database tool.</a:t>
+            </a:r>
+          </a:p>
+          <a:p>
+            <a:r>
+              <a:rPr lang="en-US" dirty="0"/>
               <a:t>And Once </a:t>
             </a:r>
             <a:r>
@@ -4140,6 +4196,9 @@
               <a:rPr lang="en-US" dirty="0"/>
               <a:t> is done we would like to convert it to the Mobile App.</a:t>
             </a:r>
+          </a:p>
+          <a:p>
+            <a:endParaRPr lang="en-US" dirty="0"/>
           </a:p>
         </p:txBody>
       </p:sp>

</xml_diff>